<commit_message>
noise clean class, script to detect bad diarization
</commit_message>
<xml_diff>
--- a/HBL_project_diary.pptx
+++ b/HBL_project_diary.pptx
@@ -258,7 +258,7 @@
           <a:p>
             <a:fld id="{70B7DE8A-2B08-4083-972E-7D0E9EE0EF12}" type="datetimeFigureOut">
               <a:rPr lang="en-US" smtClean="0"/>
-              <a:t>6/25/2023</a:t>
+              <a:t>7/1/2023</a:t>
             </a:fld>
             <a:endParaRPr lang="en-US"/>
           </a:p>
@@ -428,7 +428,7 @@
           <a:p>
             <a:fld id="{70B7DE8A-2B08-4083-972E-7D0E9EE0EF12}" type="datetimeFigureOut">
               <a:rPr lang="en-US" smtClean="0"/>
-              <a:t>6/25/2023</a:t>
+              <a:t>7/1/2023</a:t>
             </a:fld>
             <a:endParaRPr lang="en-US"/>
           </a:p>
@@ -608,7 +608,7 @@
           <a:p>
             <a:fld id="{70B7DE8A-2B08-4083-972E-7D0E9EE0EF12}" type="datetimeFigureOut">
               <a:rPr lang="en-US" smtClean="0"/>
-              <a:t>6/25/2023</a:t>
+              <a:t>7/1/2023</a:t>
             </a:fld>
             <a:endParaRPr lang="en-US"/>
           </a:p>
@@ -778,7 +778,7 @@
           <a:p>
             <a:fld id="{70B7DE8A-2B08-4083-972E-7D0E9EE0EF12}" type="datetimeFigureOut">
               <a:rPr lang="en-US" smtClean="0"/>
-              <a:t>6/25/2023</a:t>
+              <a:t>7/1/2023</a:t>
             </a:fld>
             <a:endParaRPr lang="en-US"/>
           </a:p>
@@ -1024,7 +1024,7 @@
           <a:p>
             <a:fld id="{70B7DE8A-2B08-4083-972E-7D0E9EE0EF12}" type="datetimeFigureOut">
               <a:rPr lang="en-US" smtClean="0"/>
-              <a:t>6/25/2023</a:t>
+              <a:t>7/1/2023</a:t>
             </a:fld>
             <a:endParaRPr lang="en-US"/>
           </a:p>
@@ -1256,7 +1256,7 @@
           <a:p>
             <a:fld id="{70B7DE8A-2B08-4083-972E-7D0E9EE0EF12}" type="datetimeFigureOut">
               <a:rPr lang="en-US" smtClean="0"/>
-              <a:t>6/25/2023</a:t>
+              <a:t>7/1/2023</a:t>
             </a:fld>
             <a:endParaRPr lang="en-US"/>
           </a:p>
@@ -1623,7 +1623,7 @@
           <a:p>
             <a:fld id="{70B7DE8A-2B08-4083-972E-7D0E9EE0EF12}" type="datetimeFigureOut">
               <a:rPr lang="en-US" smtClean="0"/>
-              <a:t>6/25/2023</a:t>
+              <a:t>7/1/2023</a:t>
             </a:fld>
             <a:endParaRPr lang="en-US"/>
           </a:p>
@@ -1741,7 +1741,7 @@
           <a:p>
             <a:fld id="{70B7DE8A-2B08-4083-972E-7D0E9EE0EF12}" type="datetimeFigureOut">
               <a:rPr lang="en-US" smtClean="0"/>
-              <a:t>6/25/2023</a:t>
+              <a:t>7/1/2023</a:t>
             </a:fld>
             <a:endParaRPr lang="en-US"/>
           </a:p>
@@ -1836,7 +1836,7 @@
           <a:p>
             <a:fld id="{70B7DE8A-2B08-4083-972E-7D0E9EE0EF12}" type="datetimeFigureOut">
               <a:rPr lang="en-US" smtClean="0"/>
-              <a:t>6/25/2023</a:t>
+              <a:t>7/1/2023</a:t>
             </a:fld>
             <a:endParaRPr lang="en-US"/>
           </a:p>
@@ -2113,7 +2113,7 @@
           <a:p>
             <a:fld id="{70B7DE8A-2B08-4083-972E-7D0E9EE0EF12}" type="datetimeFigureOut">
               <a:rPr lang="en-US" smtClean="0"/>
-              <a:t>6/25/2023</a:t>
+              <a:t>7/1/2023</a:t>
             </a:fld>
             <a:endParaRPr lang="en-US"/>
           </a:p>
@@ -2366,7 +2366,7 @@
           <a:p>
             <a:fld id="{70B7DE8A-2B08-4083-972E-7D0E9EE0EF12}" type="datetimeFigureOut">
               <a:rPr lang="en-US" smtClean="0"/>
-              <a:t>6/25/2023</a:t>
+              <a:t>7/1/2023</a:t>
             </a:fld>
             <a:endParaRPr lang="en-US"/>
           </a:p>
@@ -2579,7 +2579,7 @@
           <a:p>
             <a:fld id="{70B7DE8A-2B08-4083-972E-7D0E9EE0EF12}" type="datetimeFigureOut">
               <a:rPr lang="en-US" smtClean="0"/>
-              <a:t>6/25/2023</a:t>
+              <a:t>7/1/2023</a:t>
             </a:fld>
             <a:endParaRPr lang="en-US"/>
           </a:p>
@@ -4083,22 +4083,25 @@
               <a:t>in analyzation calculate </a:t>
             </a:r>
             <a:r>
+              <a:rPr lang="en-US" dirty="0" err="1" smtClean="0"/>
+              <a:t>mis</a:t>
+            </a:r>
+            <a:r>
               <a:rPr lang="en-US" dirty="0" err="1"/>
-              <a:t>mis</a:t>
+              <a:t>-</a:t>
+            </a:r>
+            <a:r>
+              <a:rPr lang="en-US" dirty="0" err="1" smtClean="0"/>
+              <a:t>diarization</a:t>
+            </a:r>
+            <a:r>
+              <a:rPr lang="en-US" dirty="0" smtClean="0"/>
+              <a:t> </a:t>
             </a:r>
             <a:r>
               <a:rPr lang="en-US" dirty="0"/>
-              <a:t> </a:t>
-            </a:r>
-            <a:r>
-              <a:rPr lang="en-US" dirty="0" err="1"/>
-              <a:t>diarization</a:t>
-            </a:r>
-            <a:r>
-              <a:rPr lang="en-US"/>
-              <a:t> per second per segment then total</a:t>
-            </a:r>
-            <a:endParaRPr lang="en-US" dirty="0"/>
+              <a:t>per second per segment then total</a:t>
+            </a:r>
           </a:p>
         </p:txBody>
       </p:sp>

</xml_diff>

<commit_message>
writing to excel, edited animation
</commit_message>
<xml_diff>
--- a/HBL_project_diary.pptx
+++ b/HBL_project_diary.pptx
@@ -21,6 +21,7 @@
     <p:sldId id="269" r:id="rId15"/>
     <p:sldId id="270" r:id="rId16"/>
     <p:sldId id="271" r:id="rId17"/>
+    <p:sldId id="272" r:id="rId18"/>
   </p:sldIdLst>
   <p:sldSz cx="12192000" cy="6858000"/>
   <p:notesSz cx="6858000" cy="9144000"/>
@@ -258,7 +259,7 @@
           <a:p>
             <a:fld id="{70B7DE8A-2B08-4083-972E-7D0E9EE0EF12}" type="datetimeFigureOut">
               <a:rPr lang="en-US" smtClean="0"/>
-              <a:t>7/1/2023</a:t>
+              <a:t>7/6/2023</a:t>
             </a:fld>
             <a:endParaRPr lang="en-US"/>
           </a:p>
@@ -428,7 +429,7 @@
           <a:p>
             <a:fld id="{70B7DE8A-2B08-4083-972E-7D0E9EE0EF12}" type="datetimeFigureOut">
               <a:rPr lang="en-US" smtClean="0"/>
-              <a:t>7/1/2023</a:t>
+              <a:t>7/6/2023</a:t>
             </a:fld>
             <a:endParaRPr lang="en-US"/>
           </a:p>
@@ -608,7 +609,7 @@
           <a:p>
             <a:fld id="{70B7DE8A-2B08-4083-972E-7D0E9EE0EF12}" type="datetimeFigureOut">
               <a:rPr lang="en-US" smtClean="0"/>
-              <a:t>7/1/2023</a:t>
+              <a:t>7/6/2023</a:t>
             </a:fld>
             <a:endParaRPr lang="en-US"/>
           </a:p>
@@ -778,7 +779,7 @@
           <a:p>
             <a:fld id="{70B7DE8A-2B08-4083-972E-7D0E9EE0EF12}" type="datetimeFigureOut">
               <a:rPr lang="en-US" smtClean="0"/>
-              <a:t>7/1/2023</a:t>
+              <a:t>7/6/2023</a:t>
             </a:fld>
             <a:endParaRPr lang="en-US"/>
           </a:p>
@@ -1024,7 +1025,7 @@
           <a:p>
             <a:fld id="{70B7DE8A-2B08-4083-972E-7D0E9EE0EF12}" type="datetimeFigureOut">
               <a:rPr lang="en-US" smtClean="0"/>
-              <a:t>7/1/2023</a:t>
+              <a:t>7/6/2023</a:t>
             </a:fld>
             <a:endParaRPr lang="en-US"/>
           </a:p>
@@ -1256,7 +1257,7 @@
           <a:p>
             <a:fld id="{70B7DE8A-2B08-4083-972E-7D0E9EE0EF12}" type="datetimeFigureOut">
               <a:rPr lang="en-US" smtClean="0"/>
-              <a:t>7/1/2023</a:t>
+              <a:t>7/6/2023</a:t>
             </a:fld>
             <a:endParaRPr lang="en-US"/>
           </a:p>
@@ -1623,7 +1624,7 @@
           <a:p>
             <a:fld id="{70B7DE8A-2B08-4083-972E-7D0E9EE0EF12}" type="datetimeFigureOut">
               <a:rPr lang="en-US" smtClean="0"/>
-              <a:t>7/1/2023</a:t>
+              <a:t>7/6/2023</a:t>
             </a:fld>
             <a:endParaRPr lang="en-US"/>
           </a:p>
@@ -1741,7 +1742,7 @@
           <a:p>
             <a:fld id="{70B7DE8A-2B08-4083-972E-7D0E9EE0EF12}" type="datetimeFigureOut">
               <a:rPr lang="en-US" smtClean="0"/>
-              <a:t>7/1/2023</a:t>
+              <a:t>7/6/2023</a:t>
             </a:fld>
             <a:endParaRPr lang="en-US"/>
           </a:p>
@@ -1836,7 +1837,7 @@
           <a:p>
             <a:fld id="{70B7DE8A-2B08-4083-972E-7D0E9EE0EF12}" type="datetimeFigureOut">
               <a:rPr lang="en-US" smtClean="0"/>
-              <a:t>7/1/2023</a:t>
+              <a:t>7/6/2023</a:t>
             </a:fld>
             <a:endParaRPr lang="en-US"/>
           </a:p>
@@ -2113,7 +2114,7 @@
           <a:p>
             <a:fld id="{70B7DE8A-2B08-4083-972E-7D0E9EE0EF12}" type="datetimeFigureOut">
               <a:rPr lang="en-US" smtClean="0"/>
-              <a:t>7/1/2023</a:t>
+              <a:t>7/6/2023</a:t>
             </a:fld>
             <a:endParaRPr lang="en-US"/>
           </a:p>
@@ -2366,7 +2367,7 @@
           <a:p>
             <a:fld id="{70B7DE8A-2B08-4083-972E-7D0E9EE0EF12}" type="datetimeFigureOut">
               <a:rPr lang="en-US" smtClean="0"/>
-              <a:t>7/1/2023</a:t>
+              <a:t>7/6/2023</a:t>
             </a:fld>
             <a:endParaRPr lang="en-US"/>
           </a:p>
@@ -2579,7 +2580,7 @@
           <a:p>
             <a:fld id="{70B7DE8A-2B08-4083-972E-7D0E9EE0EF12}" type="datetimeFigureOut">
               <a:rPr lang="en-US" smtClean="0"/>
-              <a:t>7/1/2023</a:t>
+              <a:t>7/6/2023</a:t>
             </a:fld>
             <a:endParaRPr lang="en-US"/>
           </a:p>
@@ -4118,6 +4119,156 @@
 </p:sld>
 </file>
 
+<file path=ppt/slides/slide17.xml><?xml version="1.0" encoding="utf-8"?>
+<p:sld xmlns:a="http://schemas.openxmlformats.org/drawingml/2006/main" xmlns:r="http://schemas.openxmlformats.org/officeDocument/2006/relationships" xmlns:p="http://schemas.openxmlformats.org/presentationml/2006/main">
+  <p:cSld>
+    <p:spTree>
+      <p:nvGrpSpPr>
+        <p:cNvPr id="1" name=""/>
+        <p:cNvGrpSpPr/>
+        <p:nvPr/>
+      </p:nvGrpSpPr>
+      <p:grpSpPr>
+        <a:xfrm>
+          <a:off x="0" y="0"/>
+          <a:ext cx="0" cy="0"/>
+          <a:chOff x="0" y="0"/>
+          <a:chExt cx="0" cy="0"/>
+        </a:xfrm>
+      </p:grpSpPr>
+      <p:sp>
+        <p:nvSpPr>
+          <p:cNvPr id="2" name="Title 1"/>
+          <p:cNvSpPr>
+            <a:spLocks noGrp="1"/>
+          </p:cNvSpPr>
+          <p:nvPr>
+            <p:ph type="title"/>
+          </p:nvPr>
+        </p:nvSpPr>
+        <p:spPr/>
+        <p:txBody>
+          <a:bodyPr/>
+          <a:lstStyle/>
+          <a:p>
+            <a:r>
+              <a:rPr lang="en-US" dirty="0" smtClean="0"/>
+              <a:t>Meeting 6.7</a:t>
+            </a:r>
+            <a:endParaRPr lang="en-US" dirty="0"/>
+          </a:p>
+        </p:txBody>
+      </p:sp>
+      <p:sp>
+        <p:nvSpPr>
+          <p:cNvPr id="3" name="Content Placeholder 2"/>
+          <p:cNvSpPr>
+            <a:spLocks noGrp="1"/>
+          </p:cNvSpPr>
+          <p:nvPr>
+            <p:ph idx="1"/>
+          </p:nvPr>
+        </p:nvSpPr>
+        <p:spPr>
+          <a:xfrm>
+            <a:off x="838200" y="1825624"/>
+            <a:ext cx="11442700" cy="4575175"/>
+          </a:xfrm>
+        </p:spPr>
+        <p:txBody>
+          <a:bodyPr>
+            <a:normAutofit fontScale="92500" lnSpcReduction="10000"/>
+          </a:bodyPr>
+          <a:lstStyle/>
+          <a:p>
+            <a:r>
+              <a:rPr lang="en-US" dirty="0" smtClean="0"/>
+              <a:t>Tested over 30 videos, </a:t>
+            </a:r>
+            <a:r>
+              <a:rPr lang="en-US" dirty="0" err="1" smtClean="0"/>
+              <a:t>pyannote</a:t>
+            </a:r>
+            <a:r>
+              <a:rPr lang="en-US" dirty="0" smtClean="0"/>
+              <a:t> works well in 28/30, if not for one camera then the other</a:t>
+            </a:r>
+          </a:p>
+          <a:p>
+            <a:r>
+              <a:rPr lang="en-US" dirty="0" smtClean="0"/>
+              <a:t>Noise cleaning method that worked: noise reduce library, uses spectral cleaning</a:t>
+            </a:r>
+          </a:p>
+          <a:p>
+            <a:r>
+              <a:rPr lang="en-US" dirty="0" smtClean="0"/>
+              <a:t>Added animation</a:t>
+            </a:r>
+          </a:p>
+          <a:p>
+            <a:endParaRPr lang="en-US" dirty="0"/>
+          </a:p>
+          <a:p>
+            <a:pPr marL="0" indent="0">
+              <a:buNone/>
+            </a:pPr>
+            <a:r>
+              <a:rPr lang="en-US" dirty="0" smtClean="0"/>
+              <a:t>For next meeting: </a:t>
+            </a:r>
+          </a:p>
+          <a:p>
+            <a:r>
+              <a:rPr lang="en-US" dirty="0" err="1" smtClean="0"/>
+              <a:t>Diarization</a:t>
+            </a:r>
+            <a:r>
+              <a:rPr lang="en-US" dirty="0" smtClean="0"/>
+              <a:t> for all necessary videos</a:t>
+            </a:r>
+          </a:p>
+          <a:p>
+            <a:r>
+              <a:rPr lang="en-US" dirty="0" smtClean="0"/>
+              <a:t>Finish animation</a:t>
+            </a:r>
+          </a:p>
+          <a:p>
+            <a:r>
+              <a:rPr lang="en-US" dirty="0" smtClean="0"/>
+              <a:t>Automatic script to for </a:t>
+            </a:r>
+            <a:r>
+              <a:rPr lang="en-US" dirty="0" err="1" smtClean="0"/>
+              <a:t>diarization</a:t>
+            </a:r>
+            <a:r>
+              <a:rPr lang="en-US" dirty="0" smtClean="0"/>
+              <a:t> to csv</a:t>
+            </a:r>
+          </a:p>
+          <a:p>
+            <a:r>
+              <a:rPr lang="en-US" dirty="0" smtClean="0"/>
+              <a:t>report</a:t>
+            </a:r>
+          </a:p>
+        </p:txBody>
+      </p:sp>
+    </p:spTree>
+    <p:extLst>
+      <p:ext uri="{BB962C8B-B14F-4D97-AF65-F5344CB8AC3E}">
+        <p14:creationId xmlns:p14="http://schemas.microsoft.com/office/powerpoint/2010/main" val="269119208"/>
+      </p:ext>
+    </p:extLst>
+  </p:cSld>
+  <p:clrMapOvr>
+    <a:masterClrMapping/>
+  </p:clrMapOvr>
+</p:sld>
+</file>
+
 <file path=ppt/slides/slide2.xml><?xml version="1.0" encoding="utf-8"?>
 <p:sld xmlns:a="http://schemas.openxmlformats.org/drawingml/2006/main" xmlns:r="http://schemas.openxmlformats.org/officeDocument/2006/relationships" xmlns:p="http://schemas.openxmlformats.org/presentationml/2006/main">
   <p:cSld>

</xml_diff>

<commit_message>
added automatic call to noise reduction
</commit_message>
<xml_diff>
--- a/HBL_project_diary.pptx
+++ b/HBL_project_diary.pptx
@@ -22,6 +22,7 @@
     <p:sldId id="270" r:id="rId16"/>
     <p:sldId id="271" r:id="rId17"/>
     <p:sldId id="272" r:id="rId18"/>
+    <p:sldId id="273" r:id="rId19"/>
   </p:sldIdLst>
   <p:sldSz cx="12192000" cy="6858000"/>
   <p:notesSz cx="6858000" cy="9144000"/>
@@ -259,7 +260,7 @@
           <a:p>
             <a:fld id="{70B7DE8A-2B08-4083-972E-7D0E9EE0EF12}" type="datetimeFigureOut">
               <a:rPr lang="en-US" smtClean="0"/>
-              <a:t>7/6/2023</a:t>
+              <a:t>7/11/2023</a:t>
             </a:fld>
             <a:endParaRPr lang="en-US"/>
           </a:p>
@@ -429,7 +430,7 @@
           <a:p>
             <a:fld id="{70B7DE8A-2B08-4083-972E-7D0E9EE0EF12}" type="datetimeFigureOut">
               <a:rPr lang="en-US" smtClean="0"/>
-              <a:t>7/6/2023</a:t>
+              <a:t>7/11/2023</a:t>
             </a:fld>
             <a:endParaRPr lang="en-US"/>
           </a:p>
@@ -609,7 +610,7 @@
           <a:p>
             <a:fld id="{70B7DE8A-2B08-4083-972E-7D0E9EE0EF12}" type="datetimeFigureOut">
               <a:rPr lang="en-US" smtClean="0"/>
-              <a:t>7/6/2023</a:t>
+              <a:t>7/11/2023</a:t>
             </a:fld>
             <a:endParaRPr lang="en-US"/>
           </a:p>
@@ -779,7 +780,7 @@
           <a:p>
             <a:fld id="{70B7DE8A-2B08-4083-972E-7D0E9EE0EF12}" type="datetimeFigureOut">
               <a:rPr lang="en-US" smtClean="0"/>
-              <a:t>7/6/2023</a:t>
+              <a:t>7/11/2023</a:t>
             </a:fld>
             <a:endParaRPr lang="en-US"/>
           </a:p>
@@ -1025,7 +1026,7 @@
           <a:p>
             <a:fld id="{70B7DE8A-2B08-4083-972E-7D0E9EE0EF12}" type="datetimeFigureOut">
               <a:rPr lang="en-US" smtClean="0"/>
-              <a:t>7/6/2023</a:t>
+              <a:t>7/11/2023</a:t>
             </a:fld>
             <a:endParaRPr lang="en-US"/>
           </a:p>
@@ -1257,7 +1258,7 @@
           <a:p>
             <a:fld id="{70B7DE8A-2B08-4083-972E-7D0E9EE0EF12}" type="datetimeFigureOut">
               <a:rPr lang="en-US" smtClean="0"/>
-              <a:t>7/6/2023</a:t>
+              <a:t>7/11/2023</a:t>
             </a:fld>
             <a:endParaRPr lang="en-US"/>
           </a:p>
@@ -1624,7 +1625,7 @@
           <a:p>
             <a:fld id="{70B7DE8A-2B08-4083-972E-7D0E9EE0EF12}" type="datetimeFigureOut">
               <a:rPr lang="en-US" smtClean="0"/>
-              <a:t>7/6/2023</a:t>
+              <a:t>7/11/2023</a:t>
             </a:fld>
             <a:endParaRPr lang="en-US"/>
           </a:p>
@@ -1742,7 +1743,7 @@
           <a:p>
             <a:fld id="{70B7DE8A-2B08-4083-972E-7D0E9EE0EF12}" type="datetimeFigureOut">
               <a:rPr lang="en-US" smtClean="0"/>
-              <a:t>7/6/2023</a:t>
+              <a:t>7/11/2023</a:t>
             </a:fld>
             <a:endParaRPr lang="en-US"/>
           </a:p>
@@ -1837,7 +1838,7 @@
           <a:p>
             <a:fld id="{70B7DE8A-2B08-4083-972E-7D0E9EE0EF12}" type="datetimeFigureOut">
               <a:rPr lang="en-US" smtClean="0"/>
-              <a:t>7/6/2023</a:t>
+              <a:t>7/11/2023</a:t>
             </a:fld>
             <a:endParaRPr lang="en-US"/>
           </a:p>
@@ -2114,7 +2115,7 @@
           <a:p>
             <a:fld id="{70B7DE8A-2B08-4083-972E-7D0E9EE0EF12}" type="datetimeFigureOut">
               <a:rPr lang="en-US" smtClean="0"/>
-              <a:t>7/6/2023</a:t>
+              <a:t>7/11/2023</a:t>
             </a:fld>
             <a:endParaRPr lang="en-US"/>
           </a:p>
@@ -2367,7 +2368,7 @@
           <a:p>
             <a:fld id="{70B7DE8A-2B08-4083-972E-7D0E9EE0EF12}" type="datetimeFigureOut">
               <a:rPr lang="en-US" smtClean="0"/>
-              <a:t>7/6/2023</a:t>
+              <a:t>7/11/2023</a:t>
             </a:fld>
             <a:endParaRPr lang="en-US"/>
           </a:p>
@@ -2580,7 +2581,7 @@
           <a:p>
             <a:fld id="{70B7DE8A-2B08-4083-972E-7D0E9EE0EF12}" type="datetimeFigureOut">
               <a:rPr lang="en-US" smtClean="0"/>
-              <a:t>7/6/2023</a:t>
+              <a:t>7/11/2023</a:t>
             </a:fld>
             <a:endParaRPr lang="en-US"/>
           </a:p>
@@ -4269,6 +4270,123 @@
 </p:sld>
 </file>
 
+<file path=ppt/slides/slide18.xml><?xml version="1.0" encoding="utf-8"?>
+<p:sld xmlns:a="http://schemas.openxmlformats.org/drawingml/2006/main" xmlns:r="http://schemas.openxmlformats.org/officeDocument/2006/relationships" xmlns:p="http://schemas.openxmlformats.org/presentationml/2006/main">
+  <p:cSld>
+    <p:spTree>
+      <p:nvGrpSpPr>
+        <p:cNvPr id="1" name=""/>
+        <p:cNvGrpSpPr/>
+        <p:nvPr/>
+      </p:nvGrpSpPr>
+      <p:grpSpPr>
+        <a:xfrm>
+          <a:off x="0" y="0"/>
+          <a:ext cx="0" cy="0"/>
+          <a:chOff x="0" y="0"/>
+          <a:chExt cx="0" cy="0"/>
+        </a:xfrm>
+      </p:grpSpPr>
+      <p:sp>
+        <p:nvSpPr>
+          <p:cNvPr id="2" name="Title 1"/>
+          <p:cNvSpPr>
+            <a:spLocks noGrp="1"/>
+          </p:cNvSpPr>
+          <p:nvPr>
+            <p:ph type="title"/>
+          </p:nvPr>
+        </p:nvSpPr>
+        <p:spPr/>
+        <p:txBody>
+          <a:bodyPr/>
+          <a:lstStyle/>
+          <a:p>
+            <a:r>
+              <a:rPr lang="en-US" dirty="0" smtClean="0"/>
+              <a:t>Meeting 11.7</a:t>
+            </a:r>
+            <a:endParaRPr lang="en-US" dirty="0"/>
+          </a:p>
+        </p:txBody>
+      </p:sp>
+      <p:sp>
+        <p:nvSpPr>
+          <p:cNvPr id="3" name="Content Placeholder 2"/>
+          <p:cNvSpPr>
+            <a:spLocks noGrp="1"/>
+          </p:cNvSpPr>
+          <p:nvPr>
+            <p:ph idx="1"/>
+          </p:nvPr>
+        </p:nvSpPr>
+        <p:spPr/>
+        <p:txBody>
+          <a:bodyPr/>
+          <a:lstStyle/>
+          <a:p>
+            <a:pPr marL="0" indent="0">
+              <a:buNone/>
+            </a:pPr>
+            <a:r>
+              <a:rPr lang="en-US" dirty="0" smtClean="0"/>
+              <a:t>Did the following: </a:t>
+            </a:r>
+          </a:p>
+          <a:p>
+            <a:r>
+              <a:rPr lang="en-US" dirty="0"/>
+              <a:t>Diarization for all necessary videos</a:t>
+            </a:r>
+          </a:p>
+          <a:p>
+            <a:r>
+              <a:rPr lang="en-US" dirty="0"/>
+              <a:t>Finish </a:t>
+            </a:r>
+            <a:r>
+              <a:rPr lang="en-US" dirty="0" smtClean="0"/>
+              <a:t>animation + plot</a:t>
+            </a:r>
+            <a:endParaRPr lang="en-US" dirty="0"/>
+          </a:p>
+          <a:p>
+            <a:r>
+              <a:rPr lang="en-US" dirty="0"/>
+              <a:t>Automatic script to for diarization to csv</a:t>
+            </a:r>
+          </a:p>
+          <a:p>
+            <a:r>
+              <a:rPr lang="en-US" dirty="0" smtClean="0"/>
+              <a:t>Report</a:t>
+            </a:r>
+          </a:p>
+          <a:p>
+            <a:r>
+              <a:rPr lang="en-US" smtClean="0"/>
+              <a:t>Website </a:t>
+            </a:r>
+            <a:endParaRPr lang="en-US" dirty="0"/>
+          </a:p>
+          <a:p>
+            <a:endParaRPr lang="en-US" dirty="0"/>
+          </a:p>
+        </p:txBody>
+      </p:sp>
+    </p:spTree>
+    <p:extLst>
+      <p:ext uri="{BB962C8B-B14F-4D97-AF65-F5344CB8AC3E}">
+        <p14:creationId xmlns:p14="http://schemas.microsoft.com/office/powerpoint/2010/main" val="2890342403"/>
+      </p:ext>
+    </p:extLst>
+  </p:cSld>
+  <p:clrMapOvr>
+    <a:masterClrMapping/>
+  </p:clrMapOvr>
+</p:sld>
+</file>
+
 <file path=ppt/slides/slide2.xml><?xml version="1.0" encoding="utf-8"?>
 <p:sld xmlns:a="http://schemas.openxmlformats.org/drawingml/2006/main" xmlns:r="http://schemas.openxmlformats.org/officeDocument/2006/relationships" xmlns:p="http://schemas.openxmlformats.org/presentationml/2006/main">
   <p:cSld>

</xml_diff>